<commit_message>
ADD: miror change on HLC slide
</commit_message>
<xml_diff>
--- a/Rapport/Projet_Turtlebot.pptx
+++ b/Rapport/Projet_Turtlebot.pptx
@@ -919,7 +919,7 @@
         <a:p>
           <a:r>
             <a:rPr lang="en-US" dirty="0" smtClean="0"/>
-            <a:t>Get visible AR Markers</a:t>
+            <a:t>Get AR Markers Visibility</a:t>
           </a:r>
           <a:endParaRPr lang="en-US" dirty="0"/>
         </a:p>
@@ -1314,7 +1314,7 @@
           </a:pPr>
           <a:r>
             <a:rPr lang="en-US" sz="1500" kern="1200" dirty="0" smtClean="0"/>
-            <a:t>Get visible AR Markers</a:t>
+            <a:t>Get AR Markers Visibility</a:t>
           </a:r>
           <a:endParaRPr lang="en-US" sz="1500" kern="1200" dirty="0"/>
         </a:p>

</xml_diff>